<commit_message>
[feature][mcu_upgrade_tool_ui][uart] add select baudrate function
[what] 添加可以修改波特率的功能
[why]null
[how]null
</commit_message>
<xml_diff>
--- a/doc/软件设计评审V1.2.pptx
+++ b/doc/软件设计评审V1.2.pptx
@@ -5,19 +5,19 @@
     <p:sldMasterId id="2147483648" r:id="rId1"/>
   </p:sldMasterIdLst>
   <p:notesMasterIdLst>
-    <p:notesMasterId r:id="rId12"/>
+    <p:notesMasterId r:id="rId13"/>
   </p:notesMasterIdLst>
   <p:sldIdLst>
     <p:sldId id="261" r:id="rId3"/>
     <p:sldId id="259" r:id="rId4"/>
     <p:sldId id="277" r:id="rId5"/>
     <p:sldId id="310" r:id="rId6"/>
-    <p:sldId id="298" r:id="rId7"/>
-    <p:sldId id="280" r:id="rId8"/>
-    <p:sldId id="311" r:id="rId9"/>
-    <p:sldId id="279" r:id="rId10"/>
-    <p:sldId id="276" r:id="rId11"/>
-    <p:sldId id="268" r:id="rId13"/>
+    <p:sldId id="312" r:id="rId7"/>
+    <p:sldId id="298" r:id="rId8"/>
+    <p:sldId id="280" r:id="rId9"/>
+    <p:sldId id="311" r:id="rId10"/>
+    <p:sldId id="279" r:id="rId11"/>
+    <p:sldId id="268" r:id="rId12"/>
   </p:sldIdLst>
   <p:sldSz cx="9144000" cy="5143500" type="screen16x9"/>
   <p:notesSz cx="6858000" cy="9144000"/>
@@ -435,84 +435,6 @@
     </a:lvl9pPr>
   </p:notesStyle>
 </p:notesMaster>
-</file>
-
-<file path=ppt/notesSlides/notesSlide1.xml><?xml version="1.0" encoding="utf-8"?>
-<p:notes xmlns:a="http://schemas.openxmlformats.org/drawingml/2006/main" xmlns:r="http://schemas.openxmlformats.org/officeDocument/2006/relationships" xmlns:p="http://schemas.openxmlformats.org/presentationml/2006/main">
-  <p:cSld>
-    <p:spTree>
-      <p:nvGrpSpPr>
-        <p:cNvPr id="1" name=""/>
-        <p:cNvGrpSpPr/>
-        <p:nvPr/>
-      </p:nvGrpSpPr>
-      <p:grpSpPr>
-        <a:xfrm>
-          <a:off x="0" y="0"/>
-          <a:ext cx="0" cy="0"/>
-          <a:chOff x="0" y="0"/>
-          <a:chExt cx="0" cy="0"/>
-        </a:xfrm>
-      </p:grpSpPr>
-      <p:sp>
-        <p:nvSpPr>
-          <p:cNvPr id="2" name="幻灯片图像占位符 1"/>
-          <p:cNvSpPr>
-            <a:spLocks noGrp="1" noRot="1" noChangeAspect="1"/>
-          </p:cNvSpPr>
-          <p:nvPr>
-            <p:ph type="sldImg"/>
-          </p:nvPr>
-        </p:nvSpPr>
-        <p:spPr/>
-      </p:sp>
-      <p:sp>
-        <p:nvSpPr>
-          <p:cNvPr id="3" name="备注占位符 2"/>
-          <p:cNvSpPr>
-            <a:spLocks noGrp="1"/>
-          </p:cNvSpPr>
-          <p:nvPr>
-            <p:ph type="body" idx="1"/>
-          </p:nvPr>
-        </p:nvSpPr>
-        <p:spPr/>
-        <p:txBody>
-          <a:bodyPr/>
-          <a:lstStyle/>
-          <a:p>
-            <a:endParaRPr kumimoji="1" lang="zh-CN" altLang="en-US" dirty="0"/>
-          </a:p>
-        </p:txBody>
-      </p:sp>
-      <p:sp>
-        <p:nvSpPr>
-          <p:cNvPr id="4" name="灯片编号占位符 3"/>
-          <p:cNvSpPr>
-            <a:spLocks noGrp="1"/>
-          </p:cNvSpPr>
-          <p:nvPr>
-            <p:ph type="sldNum" sz="quarter" idx="10"/>
-          </p:nvPr>
-        </p:nvSpPr>
-        <p:spPr/>
-        <p:txBody>
-          <a:bodyPr/>
-          <a:lstStyle/>
-          <a:p>
-            <a:fld id="{2FEC3D8C-82CB-BD4D-A1DB-E7DE9E519923}" type="slidenum">
-              <a:rPr kumimoji="1" lang="zh-CN" altLang="en-US" smtClean="0"/>
-            </a:fld>
-            <a:endParaRPr kumimoji="1" lang="zh-CN" altLang="en-US"/>
-          </a:p>
-        </p:txBody>
-      </p:sp>
-    </p:spTree>
-  </p:cSld>
-  <p:clrMapOvr>
-    <a:masterClrMapping/>
-  </p:clrMapOvr>
-</p:notes>
 </file>
 
 <file path=ppt/slideLayouts/slideLayout1.xml><?xml version="1.0" encoding="utf-8"?>
@@ -4931,7 +4853,7 @@
         </p:nvSpPr>
         <p:spPr>
           <a:xfrm>
-            <a:off x="353016" y="394491"/>
+            <a:off x="345396" y="378616"/>
             <a:ext cx="2714436" cy="398780"/>
           </a:xfrm>
           <a:prstGeom prst="rect">
@@ -4946,16 +4868,16 @@
           <a:lstStyle/>
           <a:p>
             <a:r>
-              <a:rPr lang="en-US" altLang="zh-CN" sz="2000" b="1" dirty="0">
+              <a:rPr lang="zh-CN" altLang="en-US" sz="2000" b="1" dirty="0">
                 <a:solidFill>
                   <a:srgbClr val="717171"/>
                 </a:solidFill>
                 <a:latin typeface="微软雅黑" panose="020B0503020204020204" pitchFamily="34" charset="-122"/>
                 <a:ea typeface="微软雅黑" panose="020B0503020204020204" pitchFamily="34" charset="-122"/>
               </a:rPr>
-              <a:t>node list</a:t>
-            </a:r>
-            <a:endParaRPr lang="en-US" altLang="zh-CN" sz="2000" b="1" dirty="0">
+              <a:t>线程设计</a:t>
+            </a:r>
+            <a:endParaRPr lang="zh-CN" altLang="en-US" sz="2000" b="1" dirty="0">
               <a:solidFill>
                 <a:srgbClr val="717171"/>
               </a:solidFill>
@@ -5063,8 +4985,8 @@
         </p:blipFill>
         <p:spPr>
           <a:xfrm>
-            <a:off x="475615" y="1638300"/>
-            <a:ext cx="8192770" cy="2345055"/>
+            <a:off x="3209925" y="1176655"/>
+            <a:ext cx="2468880" cy="3268980"/>
           </a:xfrm>
           <a:prstGeom prst="rect">
             <a:avLst/>
@@ -5080,6 +5002,179 @@
 </file>
 
 <file path=ppt/slides/slide6.xml><?xml version="1.0" encoding="utf-8"?>
+<p:sld xmlns:a="http://schemas.openxmlformats.org/drawingml/2006/main" xmlns:r="http://schemas.openxmlformats.org/officeDocument/2006/relationships" xmlns:p="http://schemas.openxmlformats.org/presentationml/2006/main">
+  <p:cSld>
+    <p:spTree>
+      <p:nvGrpSpPr>
+        <p:cNvPr id="1" name=""/>
+        <p:cNvGrpSpPr/>
+        <p:nvPr/>
+      </p:nvGrpSpPr>
+      <p:grpSpPr>
+        <a:xfrm>
+          <a:off x="0" y="0"/>
+          <a:ext cx="0" cy="0"/>
+          <a:chOff x="0" y="0"/>
+          <a:chExt cx="0" cy="0"/>
+        </a:xfrm>
+      </p:grpSpPr>
+      <p:sp>
+        <p:nvSpPr>
+          <p:cNvPr id="8" name="TextBox 7"/>
+          <p:cNvSpPr txBox="1"/>
+          <p:nvPr/>
+        </p:nvSpPr>
+        <p:spPr>
+          <a:xfrm>
+            <a:off x="353016" y="394491"/>
+            <a:ext cx="2714436" cy="398780"/>
+          </a:xfrm>
+          <a:prstGeom prst="rect">
+            <a:avLst/>
+          </a:prstGeom>
+          <a:noFill/>
+        </p:spPr>
+        <p:txBody>
+          <a:bodyPr wrap="square" rtlCol="0">
+            <a:spAutoFit/>
+          </a:bodyPr>
+          <a:lstStyle/>
+          <a:p>
+            <a:r>
+              <a:rPr lang="en-US" altLang="zh-CN" sz="2000" b="1" dirty="0">
+                <a:solidFill>
+                  <a:srgbClr val="717171"/>
+                </a:solidFill>
+                <a:latin typeface="微软雅黑" panose="020B0503020204020204" pitchFamily="34" charset="-122"/>
+                <a:ea typeface="微软雅黑" panose="020B0503020204020204" pitchFamily="34" charset="-122"/>
+              </a:rPr>
+              <a:t>node list</a:t>
+            </a:r>
+            <a:endParaRPr lang="en-US" altLang="zh-CN" sz="2000" b="1" dirty="0">
+              <a:solidFill>
+                <a:srgbClr val="717171"/>
+              </a:solidFill>
+              <a:latin typeface="微软雅黑" panose="020B0503020204020204" pitchFamily="34" charset="-122"/>
+              <a:ea typeface="微软雅黑" panose="020B0503020204020204" pitchFamily="34" charset="-122"/>
+            </a:endParaRPr>
+          </a:p>
+        </p:txBody>
+      </p:sp>
+      <p:pic>
+        <p:nvPicPr>
+          <p:cNvPr id="6" name="Picture 3" descr="C:\Users\yyyy\Desktop\辅助1.jpg"/>
+          <p:cNvPicPr>
+            <a:picLocks noChangeArrowheads="1"/>
+          </p:cNvPicPr>
+          <p:nvPr/>
+        </p:nvPicPr>
+        <p:blipFill rotWithShape="1">
+          <a:blip r:embed="rId1" cstate="print">
+            <a:extLst>
+              <a:ext uri="{28A0092B-C50C-407E-A947-70E740481C1C}">
+                <a14:useLocalDpi xmlns:a14="http://schemas.microsoft.com/office/drawing/2010/main" val="0"/>
+              </a:ext>
+            </a:extLst>
+          </a:blip>
+          <a:srcRect t="67499"/>
+          <a:stretch>
+            <a:fillRect/>
+          </a:stretch>
+        </p:blipFill>
+        <p:spPr bwMode="auto">
+          <a:xfrm>
+            <a:off x="428936" y="793065"/>
+            <a:ext cx="8280000" cy="18000"/>
+          </a:xfrm>
+          <a:prstGeom prst="rect">
+            <a:avLst/>
+          </a:prstGeom>
+          <a:noFill/>
+          <a:extLst>
+            <a:ext uri="{909E8E84-426E-40DD-AFC4-6F175D3DCCD1}">
+              <a14:hiddenFill xmlns:a14="http://schemas.microsoft.com/office/drawing/2010/main">
+                <a:solidFill>
+                  <a:srgbClr val="FFFFFF"/>
+                </a:solidFill>
+              </a14:hiddenFill>
+            </a:ext>
+          </a:extLst>
+        </p:spPr>
+      </p:pic>
+      <p:pic>
+        <p:nvPicPr>
+          <p:cNvPr id="7" name="Picture 2" descr="C:\Users\User\Desktop\胸牌源文件-03.png"/>
+          <p:cNvPicPr>
+            <a:picLocks noChangeAspect="1" noChangeArrowheads="1"/>
+          </p:cNvPicPr>
+          <p:nvPr/>
+        </p:nvPicPr>
+        <p:blipFill>
+          <a:blip r:embed="rId2" cstate="print">
+            <a:extLst>
+              <a:ext uri="{28A0092B-C50C-407E-A947-70E740481C1C}">
+                <a14:useLocalDpi xmlns:a14="http://schemas.microsoft.com/office/drawing/2010/main" val="0"/>
+              </a:ext>
+            </a:extLst>
+          </a:blip>
+          <a:srcRect/>
+          <a:stretch>
+            <a:fillRect/>
+          </a:stretch>
+        </p:blipFill>
+        <p:spPr bwMode="auto">
+          <a:xfrm>
+            <a:off x="7884368" y="307596"/>
+            <a:ext cx="879762" cy="503469"/>
+          </a:xfrm>
+          <a:prstGeom prst="rect">
+            <a:avLst/>
+          </a:prstGeom>
+          <a:noFill/>
+          <a:extLst>
+            <a:ext uri="{909E8E84-426E-40DD-AFC4-6F175D3DCCD1}">
+              <a14:hiddenFill xmlns:a14="http://schemas.microsoft.com/office/drawing/2010/main">
+                <a:solidFill>
+                  <a:srgbClr val="FFFFFF"/>
+                </a:solidFill>
+              </a14:hiddenFill>
+            </a:ext>
+          </a:extLst>
+        </p:spPr>
+      </p:pic>
+      <p:pic>
+        <p:nvPicPr>
+          <p:cNvPr id="2" name="图片 1"/>
+          <p:cNvPicPr>
+            <a:picLocks noChangeAspect="1"/>
+          </p:cNvPicPr>
+          <p:nvPr/>
+        </p:nvPicPr>
+        <p:blipFill>
+          <a:blip r:embed="rId3"/>
+          <a:stretch>
+            <a:fillRect/>
+          </a:stretch>
+        </p:blipFill>
+        <p:spPr>
+          <a:xfrm>
+            <a:off x="475615" y="1638300"/>
+            <a:ext cx="8192770" cy="2345055"/>
+          </a:xfrm>
+          <a:prstGeom prst="rect">
+            <a:avLst/>
+          </a:prstGeom>
+        </p:spPr>
+      </p:pic>
+    </p:spTree>
+  </p:cSld>
+  <p:clrMapOvr>
+    <a:masterClrMapping/>
+  </p:clrMapOvr>
+</p:sld>
+</file>
+
+<file path=ppt/slides/slide7.xml><?xml version="1.0" encoding="utf-8"?>
 <p:sld xmlns:a="http://schemas.openxmlformats.org/drawingml/2006/main" xmlns:r="http://schemas.openxmlformats.org/officeDocument/2006/relationships" xmlns:p="http://schemas.openxmlformats.org/presentationml/2006/main">
   <p:cSld>
     <p:spTree>
@@ -5354,7 +5449,7 @@
 </p:sld>
 </file>
 
-<file path=ppt/slides/slide7.xml><?xml version="1.0" encoding="utf-8"?>
+<file path=ppt/slides/slide8.xml><?xml version="1.0" encoding="utf-8"?>
 <p:sld xmlns:a="http://schemas.openxmlformats.org/drawingml/2006/main" xmlns:r="http://schemas.openxmlformats.org/officeDocument/2006/relationships" xmlns:p="http://schemas.openxmlformats.org/presentationml/2006/main">
   <p:cSld>
     <p:spTree>
@@ -5533,189 +5628,6 @@
           <a:xfrm>
             <a:off x="1320165" y="1531620"/>
             <a:ext cx="6496685" cy="2813685"/>
-          </a:xfrm>
-          <a:prstGeom prst="rect">
-            <a:avLst/>
-          </a:prstGeom>
-        </p:spPr>
-      </p:pic>
-    </p:spTree>
-  </p:cSld>
-  <p:clrMapOvr>
-    <a:masterClrMapping/>
-  </p:clrMapOvr>
-</p:sld>
-</file>
-
-<file path=ppt/slides/slide8.xml><?xml version="1.0" encoding="utf-8"?>
-<p:sld xmlns:a="http://schemas.openxmlformats.org/drawingml/2006/main" xmlns:r="http://schemas.openxmlformats.org/officeDocument/2006/relationships" xmlns:p="http://schemas.openxmlformats.org/presentationml/2006/main">
-  <p:cSld>
-    <p:spTree>
-      <p:nvGrpSpPr>
-        <p:cNvPr id="1" name=""/>
-        <p:cNvGrpSpPr/>
-        <p:nvPr/>
-      </p:nvGrpSpPr>
-      <p:grpSpPr>
-        <a:xfrm>
-          <a:off x="0" y="0"/>
-          <a:ext cx="0" cy="0"/>
-          <a:chOff x="0" y="0"/>
-          <a:chExt cx="0" cy="0"/>
-        </a:xfrm>
-      </p:grpSpPr>
-      <p:sp>
-        <p:nvSpPr>
-          <p:cNvPr id="8" name="TextBox 7"/>
-          <p:cNvSpPr txBox="1"/>
-          <p:nvPr/>
-        </p:nvSpPr>
-        <p:spPr>
-          <a:xfrm>
-            <a:off x="345396" y="378616"/>
-            <a:ext cx="2714436" cy="400110"/>
-          </a:xfrm>
-          <a:prstGeom prst="rect">
-            <a:avLst/>
-          </a:prstGeom>
-          <a:noFill/>
-        </p:spPr>
-        <p:txBody>
-          <a:bodyPr wrap="square" rtlCol="0">
-            <a:spAutoFit/>
-          </a:bodyPr>
-          <a:lstStyle/>
-          <a:p>
-            <a:r>
-              <a:rPr lang="zh-CN" altLang="en-US" sz="2000" b="1" dirty="0">
-                <a:solidFill>
-                  <a:srgbClr val="717171"/>
-                </a:solidFill>
-                <a:latin typeface="微软雅黑" panose="020B0503020204020204" pitchFamily="34" charset="-122"/>
-                <a:ea typeface="微软雅黑" panose="020B0503020204020204" pitchFamily="34" charset="-122"/>
-              </a:rPr>
-              <a:t>界</a:t>
-            </a:r>
-            <a:r>
-              <a:rPr lang="zh-CN" altLang="en-US" sz="2000" b="1" dirty="0" smtClean="0">
-                <a:solidFill>
-                  <a:srgbClr val="717171"/>
-                </a:solidFill>
-                <a:latin typeface="微软雅黑" panose="020B0503020204020204" pitchFamily="34" charset="-122"/>
-                <a:ea typeface="微软雅黑" panose="020B0503020204020204" pitchFamily="34" charset="-122"/>
-              </a:rPr>
-              <a:t>面、交互设计</a:t>
-            </a:r>
-            <a:endParaRPr lang="zh-CN" altLang="en-US" sz="2000" b="1" dirty="0">
-              <a:solidFill>
-                <a:srgbClr val="717171"/>
-              </a:solidFill>
-              <a:latin typeface="微软雅黑" panose="020B0503020204020204" pitchFamily="34" charset="-122"/>
-              <a:ea typeface="微软雅黑" panose="020B0503020204020204" pitchFamily="34" charset="-122"/>
-            </a:endParaRPr>
-          </a:p>
-        </p:txBody>
-      </p:sp>
-      <p:pic>
-        <p:nvPicPr>
-          <p:cNvPr id="6" name="Picture 3" descr="C:\Users\yyyy\Desktop\辅助1.jpg"/>
-          <p:cNvPicPr>
-            <a:picLocks noChangeArrowheads="1"/>
-          </p:cNvPicPr>
-          <p:nvPr/>
-        </p:nvPicPr>
-        <p:blipFill rotWithShape="1">
-          <a:blip r:embed="rId1" cstate="print">
-            <a:extLst>
-              <a:ext uri="{28A0092B-C50C-407E-A947-70E740481C1C}">
-                <a14:useLocalDpi xmlns:a14="http://schemas.microsoft.com/office/drawing/2010/main" val="0"/>
-              </a:ext>
-            </a:extLst>
-          </a:blip>
-          <a:srcRect t="67499"/>
-          <a:stretch>
-            <a:fillRect/>
-          </a:stretch>
-        </p:blipFill>
-        <p:spPr bwMode="auto">
-          <a:xfrm>
-            <a:off x="428936" y="793065"/>
-            <a:ext cx="8280000" cy="18000"/>
-          </a:xfrm>
-          <a:prstGeom prst="rect">
-            <a:avLst/>
-          </a:prstGeom>
-          <a:noFill/>
-          <a:extLst>
-            <a:ext uri="{909E8E84-426E-40DD-AFC4-6F175D3DCCD1}">
-              <a14:hiddenFill xmlns:a14="http://schemas.microsoft.com/office/drawing/2010/main">
-                <a:solidFill>
-                  <a:srgbClr val="FFFFFF"/>
-                </a:solidFill>
-              </a14:hiddenFill>
-            </a:ext>
-          </a:extLst>
-        </p:spPr>
-      </p:pic>
-      <p:pic>
-        <p:nvPicPr>
-          <p:cNvPr id="7" name="Picture 2" descr="C:\Users\User\Desktop\胸牌源文件-03.png"/>
-          <p:cNvPicPr>
-            <a:picLocks noChangeAspect="1" noChangeArrowheads="1"/>
-          </p:cNvPicPr>
-          <p:nvPr/>
-        </p:nvPicPr>
-        <p:blipFill>
-          <a:blip r:embed="rId2" cstate="print">
-            <a:extLst>
-              <a:ext uri="{28A0092B-C50C-407E-A947-70E740481C1C}">
-                <a14:useLocalDpi xmlns:a14="http://schemas.microsoft.com/office/drawing/2010/main" val="0"/>
-              </a:ext>
-            </a:extLst>
-          </a:blip>
-          <a:srcRect/>
-          <a:stretch>
-            <a:fillRect/>
-          </a:stretch>
-        </p:blipFill>
-        <p:spPr bwMode="auto">
-          <a:xfrm>
-            <a:off x="7884368" y="307596"/>
-            <a:ext cx="879762" cy="503469"/>
-          </a:xfrm>
-          <a:prstGeom prst="rect">
-            <a:avLst/>
-          </a:prstGeom>
-          <a:noFill/>
-          <a:extLst>
-            <a:ext uri="{909E8E84-426E-40DD-AFC4-6F175D3DCCD1}">
-              <a14:hiddenFill xmlns:a14="http://schemas.microsoft.com/office/drawing/2010/main">
-                <a:solidFill>
-                  <a:srgbClr val="FFFFFF"/>
-                </a:solidFill>
-              </a14:hiddenFill>
-            </a:ext>
-          </a:extLst>
-        </p:spPr>
-      </p:pic>
-      <p:pic>
-        <p:nvPicPr>
-          <p:cNvPr id="2" name="图片 1"/>
-          <p:cNvPicPr>
-            <a:picLocks noChangeAspect="1"/>
-          </p:cNvPicPr>
-          <p:nvPr/>
-        </p:nvPicPr>
-        <p:blipFill>
-          <a:blip r:embed="rId3"/>
-          <a:stretch>
-            <a:fillRect/>
-          </a:stretch>
-        </p:blipFill>
-        <p:spPr>
-          <a:xfrm>
-            <a:off x="2141855" y="879475"/>
-            <a:ext cx="4860290" cy="4022725"/>
           </a:xfrm>
           <a:prstGeom prst="rect">
             <a:avLst/>
@@ -5749,54 +5661,6 @@
       </p:grpSpPr>
       <p:sp>
         <p:nvSpPr>
-          <p:cNvPr id="16" name="矩形 15"/>
-          <p:cNvSpPr/>
-          <p:nvPr/>
-        </p:nvSpPr>
-        <p:spPr>
-          <a:xfrm>
-            <a:off x="428936" y="987574"/>
-            <a:ext cx="8280000" cy="3888432"/>
-          </a:xfrm>
-          <a:prstGeom prst="rect">
-            <a:avLst/>
-          </a:prstGeom>
-          <a:solidFill>
-            <a:schemeClr val="bg1">
-              <a:lumMod val="85000"/>
-            </a:schemeClr>
-          </a:solidFill>
-          <a:ln>
-            <a:noFill/>
-          </a:ln>
-        </p:spPr>
-        <p:style>
-          <a:lnRef idx="2">
-            <a:schemeClr val="accent1">
-              <a:shade val="50000"/>
-            </a:schemeClr>
-          </a:lnRef>
-          <a:fillRef idx="1">
-            <a:schemeClr val="accent1"/>
-          </a:fillRef>
-          <a:effectRef idx="0">
-            <a:schemeClr val="accent1"/>
-          </a:effectRef>
-          <a:fontRef idx="minor">
-            <a:schemeClr val="lt1"/>
-          </a:fontRef>
-        </p:style>
-        <p:txBody>
-          <a:bodyPr rtlCol="0" anchor="ctr"/>
-          <a:lstStyle/>
-          <a:p>
-            <a:pPr algn="ctr"/>
-            <a:endParaRPr kumimoji="1" lang="zh-CN" altLang="en-US" dirty="0"/>
-          </a:p>
-        </p:txBody>
-      </p:sp>
-      <p:sp>
-        <p:nvSpPr>
           <p:cNvPr id="8" name="TextBox 7"/>
           <p:cNvSpPr txBox="1"/>
           <p:nvPr/>
@@ -5804,7 +5668,7 @@
         <p:spPr>
           <a:xfrm>
             <a:off x="345396" y="378616"/>
-            <a:ext cx="7538972" cy="400110"/>
+            <a:ext cx="2714436" cy="400110"/>
           </a:xfrm>
           <a:prstGeom prst="rect">
             <a:avLst/>
@@ -5825,7 +5689,17 @@
                 <a:latin typeface="微软雅黑" panose="020B0503020204020204" pitchFamily="34" charset="-122"/>
                 <a:ea typeface="微软雅黑" panose="020B0503020204020204" pitchFamily="34" charset="-122"/>
               </a:rPr>
-              <a:t>图文</a:t>
+              <a:t>界</a:t>
+            </a:r>
+            <a:r>
+              <a:rPr lang="zh-CN" altLang="en-US" sz="2000" b="1" dirty="0" smtClean="0">
+                <a:solidFill>
+                  <a:srgbClr val="717171"/>
+                </a:solidFill>
+                <a:latin typeface="微软雅黑" panose="020B0503020204020204" pitchFamily="34" charset="-122"/>
+                <a:ea typeface="微软雅黑" panose="020B0503020204020204" pitchFamily="34" charset="-122"/>
+              </a:rPr>
+              <a:t>面、交互设计</a:t>
             </a:r>
             <a:endParaRPr lang="zh-CN" altLang="en-US" sz="2000" b="1" dirty="0">
               <a:solidFill>
@@ -5919,285 +5793,30 @@
           </a:extLst>
         </p:spPr>
       </p:pic>
-      <p:sp>
-        <p:nvSpPr>
-          <p:cNvPr id="10" name="TextBox 11"/>
-          <p:cNvSpPr txBox="1"/>
+      <p:pic>
+        <p:nvPicPr>
+          <p:cNvPr id="2" name="图片 1"/>
+          <p:cNvPicPr>
+            <a:picLocks noChangeAspect="1"/>
+          </p:cNvPicPr>
           <p:nvPr/>
-        </p:nvSpPr>
+        </p:nvPicPr>
+        <p:blipFill>
+          <a:blip r:embed="rId3"/>
+          <a:stretch>
+            <a:fillRect/>
+          </a:stretch>
+        </p:blipFill>
         <p:spPr>
           <a:xfrm>
-            <a:off x="345396" y="1871339"/>
-            <a:ext cx="3506524" cy="2120902"/>
+            <a:off x="2141855" y="879475"/>
+            <a:ext cx="4860290" cy="4022725"/>
           </a:xfrm>
           <a:prstGeom prst="rect">
             <a:avLst/>
           </a:prstGeom>
-          <a:noFill/>
-        </p:spPr>
-        <p:txBody>
-          <a:bodyPr wrap="square" rtlCol="0">
-            <a:spAutoFit/>
-          </a:bodyPr>
-          <a:lstStyle/>
-          <a:p>
-            <a:pPr>
-              <a:lnSpc>
-                <a:spcPct val="150000"/>
-              </a:lnSpc>
-            </a:pPr>
-            <a:r>
-              <a:rPr lang="zh-CN" altLang="en-US" dirty="0">
-                <a:solidFill>
-                  <a:srgbClr val="717171"/>
-                </a:solidFill>
-                <a:latin typeface="微软雅黑" panose="020B0503020204020204" pitchFamily="34" charset="-122"/>
-                <a:ea typeface="微软雅黑" panose="020B0503020204020204" pitchFamily="34" charset="-122"/>
-              </a:rPr>
-              <a:t>图文搭配时，左边文字，右边图片，文字和图片均置于内容放置区域的中间位置</a:t>
-            </a:r>
-            <a:endParaRPr lang="en-US" altLang="zh-CN" dirty="0">
-              <a:solidFill>
-                <a:srgbClr val="717171"/>
-              </a:solidFill>
-              <a:latin typeface="微软雅黑" panose="020B0503020204020204" pitchFamily="34" charset="-122"/>
-              <a:ea typeface="微软雅黑" panose="020B0503020204020204" pitchFamily="34" charset="-122"/>
-            </a:endParaRPr>
-          </a:p>
-          <a:p>
-            <a:pPr>
-              <a:lnSpc>
-                <a:spcPct val="150000"/>
-              </a:lnSpc>
-            </a:pPr>
-            <a:r>
-              <a:rPr lang="zh-CN" altLang="en-US" dirty="0">
-                <a:solidFill>
-                  <a:srgbClr val="717171"/>
-                </a:solidFill>
-                <a:latin typeface="微软雅黑" panose="020B0503020204020204" pitchFamily="34" charset="-122"/>
-                <a:ea typeface="微软雅黑" panose="020B0503020204020204" pitchFamily="34" charset="-122"/>
-              </a:rPr>
-              <a:t>字号：</a:t>
-            </a:r>
-            <a:r>
-              <a:rPr lang="en-US" altLang="zh-CN" dirty="0">
-                <a:solidFill>
-                  <a:srgbClr val="717171"/>
-                </a:solidFill>
-                <a:latin typeface="微软雅黑" panose="020B0503020204020204" pitchFamily="34" charset="-122"/>
-                <a:ea typeface="微软雅黑" panose="020B0503020204020204" pitchFamily="34" charset="-122"/>
-              </a:rPr>
-              <a:t>18-24</a:t>
-            </a:r>
-            <a:r>
-              <a:rPr lang="zh-CN" altLang="en-US" dirty="0">
-                <a:solidFill>
-                  <a:srgbClr val="717171"/>
-                </a:solidFill>
-                <a:latin typeface="微软雅黑" panose="020B0503020204020204" pitchFamily="34" charset="-122"/>
-                <a:ea typeface="微软雅黑" panose="020B0503020204020204" pitchFamily="34" charset="-122"/>
-              </a:rPr>
-              <a:t>，字体：微软雅黑，颜色：深灰色，行距：</a:t>
-            </a:r>
-            <a:r>
-              <a:rPr lang="en-US" altLang="zh-CN" dirty="0">
-                <a:solidFill>
-                  <a:srgbClr val="717171"/>
-                </a:solidFill>
-                <a:latin typeface="微软雅黑" panose="020B0503020204020204" pitchFamily="34" charset="-122"/>
-                <a:ea typeface="微软雅黑" panose="020B0503020204020204" pitchFamily="34" charset="-122"/>
-              </a:rPr>
-              <a:t>1.2-1.5</a:t>
-            </a:r>
-            <a:r>
-              <a:rPr lang="zh-CN" altLang="en-US" dirty="0">
-                <a:solidFill>
-                  <a:srgbClr val="717171"/>
-                </a:solidFill>
-                <a:latin typeface="微软雅黑" panose="020B0503020204020204" pitchFamily="34" charset="-122"/>
-                <a:ea typeface="微软雅黑" panose="020B0503020204020204" pitchFamily="34" charset="-122"/>
-              </a:rPr>
-              <a:t>倍</a:t>
-            </a:r>
-            <a:endParaRPr lang="en-US" altLang="zh-CN" dirty="0">
-              <a:solidFill>
-                <a:srgbClr val="717171"/>
-              </a:solidFill>
-              <a:latin typeface="微软雅黑" panose="020B0503020204020204" pitchFamily="34" charset="-122"/>
-              <a:ea typeface="微软雅黑" panose="020B0503020204020204" pitchFamily="34" charset="-122"/>
-            </a:endParaRPr>
-          </a:p>
-        </p:txBody>
-      </p:sp>
-      <p:sp>
-        <p:nvSpPr>
-          <p:cNvPr id="11" name="矩形 10"/>
-          <p:cNvSpPr/>
-          <p:nvPr/>
-        </p:nvSpPr>
-        <p:spPr>
-          <a:xfrm>
-            <a:off x="4067944" y="987574"/>
-            <a:ext cx="4640992" cy="3888432"/>
-          </a:xfrm>
-          <a:prstGeom prst="rect">
-            <a:avLst/>
-          </a:prstGeom>
-          <a:solidFill>
-            <a:schemeClr val="tx2">
-              <a:lumMod val="20000"/>
-              <a:lumOff val="80000"/>
-            </a:schemeClr>
-          </a:solidFill>
-          <a:ln>
-            <a:noFill/>
-          </a:ln>
-        </p:spPr>
-        <p:style>
-          <a:lnRef idx="2">
-            <a:schemeClr val="accent1">
-              <a:shade val="50000"/>
-            </a:schemeClr>
-          </a:lnRef>
-          <a:fillRef idx="1">
-            <a:schemeClr val="accent1"/>
-          </a:fillRef>
-          <a:effectRef idx="0">
-            <a:schemeClr val="accent1"/>
-          </a:effectRef>
-          <a:fontRef idx="minor">
-            <a:schemeClr val="lt1"/>
-          </a:fontRef>
-        </p:style>
-        <p:txBody>
-          <a:bodyPr rtlCol="0" anchor="ctr"/>
-          <a:lstStyle/>
-          <a:p>
-            <a:pPr algn="ctr"/>
-            <a:endParaRPr kumimoji="1" lang="zh-CN" altLang="en-US" dirty="0"/>
-          </a:p>
-        </p:txBody>
-      </p:sp>
-      <p:cxnSp>
-        <p:nvCxnSpPr>
-          <p:cNvPr id="12" name="直线箭头连接符 11"/>
-          <p:cNvCxnSpPr/>
-          <p:nvPr/>
-        </p:nvCxnSpPr>
-        <p:spPr>
-          <a:xfrm>
-            <a:off x="2195736" y="987574"/>
-            <a:ext cx="0" cy="883765"/>
-          </a:xfrm>
-          <a:prstGeom prst="straightConnector1">
-            <a:avLst/>
-          </a:prstGeom>
-          <a:ln>
-            <a:solidFill>
-              <a:srgbClr val="FF0000"/>
-            </a:solidFill>
-            <a:tailEnd type="triangle"/>
-          </a:ln>
-        </p:spPr>
-        <p:style>
-          <a:lnRef idx="1">
-            <a:schemeClr val="accent1"/>
-          </a:lnRef>
-          <a:fillRef idx="0">
-            <a:schemeClr val="accent1"/>
-          </a:fillRef>
-          <a:effectRef idx="0">
-            <a:schemeClr val="accent1"/>
-          </a:effectRef>
-          <a:fontRef idx="minor">
-            <a:schemeClr val="tx1"/>
-          </a:fontRef>
-        </p:style>
-      </p:cxnSp>
-      <p:cxnSp>
-        <p:nvCxnSpPr>
-          <p:cNvPr id="13" name="直线箭头连接符 12"/>
-          <p:cNvCxnSpPr/>
-          <p:nvPr/>
-        </p:nvCxnSpPr>
-        <p:spPr>
-          <a:xfrm flipV="1">
-            <a:off x="2195736" y="4020945"/>
-            <a:ext cx="0" cy="855061"/>
-          </a:xfrm>
-          <a:prstGeom prst="straightConnector1">
-            <a:avLst/>
-          </a:prstGeom>
-          <a:ln>
-            <a:solidFill>
-              <a:srgbClr val="FF0000"/>
-            </a:solidFill>
-            <a:tailEnd type="triangle"/>
-          </a:ln>
-        </p:spPr>
-        <p:style>
-          <a:lnRef idx="1">
-            <a:schemeClr val="accent1"/>
-          </a:lnRef>
-          <a:fillRef idx="0">
-            <a:schemeClr val="accent1"/>
-          </a:fillRef>
-          <a:effectRef idx="0">
-            <a:schemeClr val="accent1"/>
-          </a:effectRef>
-          <a:fontRef idx="minor">
-            <a:schemeClr val="tx1"/>
-          </a:fontRef>
-        </p:style>
-      </p:cxnSp>
-      <p:sp>
-        <p:nvSpPr>
-          <p:cNvPr id="14" name="TextBox 11"/>
-          <p:cNvSpPr txBox="1"/>
-          <p:nvPr/>
-        </p:nvSpPr>
-        <p:spPr>
-          <a:xfrm>
-            <a:off x="6087599" y="1663590"/>
-            <a:ext cx="601681" cy="2536400"/>
-          </a:xfrm>
-          <a:prstGeom prst="rect">
-            <a:avLst/>
-          </a:prstGeom>
-          <a:noFill/>
-        </p:spPr>
-        <p:txBody>
-          <a:bodyPr wrap="square" rtlCol="0">
-            <a:spAutoFit/>
-          </a:bodyPr>
-          <a:lstStyle/>
-          <a:p>
-            <a:pPr>
-              <a:lnSpc>
-                <a:spcPct val="150000"/>
-              </a:lnSpc>
-            </a:pPr>
-            <a:r>
-              <a:rPr lang="zh-CN" altLang="en-US" dirty="0">
-                <a:solidFill>
-                  <a:srgbClr val="717171"/>
-                </a:solidFill>
-                <a:latin typeface="微软雅黑" panose="020B0503020204020204" pitchFamily="34" charset="-122"/>
-                <a:ea typeface="微软雅黑" panose="020B0503020204020204" pitchFamily="34" charset="-122"/>
-              </a:rPr>
-              <a:t>图片放置区域</a:t>
-            </a:r>
-            <a:endParaRPr lang="en-US" altLang="zh-CN" dirty="0">
-              <a:solidFill>
-                <a:srgbClr val="717171"/>
-              </a:solidFill>
-              <a:latin typeface="微软雅黑" panose="020B0503020204020204" pitchFamily="34" charset="-122"/>
-              <a:ea typeface="微软雅黑" panose="020B0503020204020204" pitchFamily="34" charset="-122"/>
-            </a:endParaRPr>
-          </a:p>
-        </p:txBody>
-      </p:sp>
+        </p:spPr>
+      </p:pic>
     </p:spTree>
   </p:cSld>
   <p:clrMapOvr>

</xml_diff>